<commit_message>
fixed course number :)
</commit_message>
<xml_diff>
--- a/Slides/Lesson 5.1 Introduction to Testing.pptx
+++ b/Slides/Lesson 5.1 Introduction to Testing.pptx
@@ -211,7 +211,7 @@
           <a:p>
             <a:fld id="{7C7E5181-6CF5-45F7-A87A-E0E0B1FD7549}" type="datetimeFigureOut">
               <a:rPr lang="en-US" smtClean="0"/>
-              <a:t>2/13/2022</a:t>
+              <a:t>2/14/2022</a:t>
             </a:fld>
             <a:endParaRPr lang="en-US"/>
           </a:p>
@@ -2040,7 +2040,7 @@
           <a:p>
             <a:fld id="{5D2A64DE-480B-420F-9649-4F8E696E08E0}" type="datetime1">
               <a:rPr lang="en-US" smtClean="0"/>
-              <a:t>2/13/2022</a:t>
+              <a:t>2/14/2022</a:t>
             </a:fld>
             <a:endParaRPr lang="en-US"/>
           </a:p>
@@ -2274,7 +2274,7 @@
           <a:p>
             <a:fld id="{0D3616D0-8311-4107-9726-6B805E7D05BA}" type="datetime1">
               <a:rPr lang="en-US" smtClean="0"/>
-              <a:t>2/13/2022</a:t>
+              <a:t>2/14/2022</a:t>
             </a:fld>
             <a:endParaRPr lang="en-US"/>
           </a:p>
@@ -2482,7 +2482,7 @@
           <a:p>
             <a:fld id="{3BC2557A-5C88-417A-A763-5AC779462A5F}" type="datetime1">
               <a:rPr lang="en-US" smtClean="0"/>
-              <a:t>2/13/2022</a:t>
+              <a:t>2/14/2022</a:t>
             </a:fld>
             <a:endParaRPr lang="en-US"/>
           </a:p>
@@ -3012,7 +3012,7 @@
           <a:p>
             <a:fld id="{07C7BFD4-467E-4EDE-93EA-052F5B39A4E5}" type="datetime1">
               <a:rPr lang="en-US" smtClean="0"/>
-              <a:t>2/13/2022</a:t>
+              <a:t>2/14/2022</a:t>
             </a:fld>
             <a:endParaRPr lang="en-US"/>
           </a:p>
@@ -3326,7 +3326,7 @@
           <a:p>
             <a:fld id="{A533CBE2-D5BE-47AC-ADC2-9CDFC1D0CF90}" type="datetime1">
               <a:rPr lang="en-US" smtClean="0"/>
-              <a:t>2/13/2022</a:t>
+              <a:t>2/14/2022</a:t>
             </a:fld>
             <a:endParaRPr lang="en-US"/>
           </a:p>
@@ -3629,7 +3629,7 @@
           <a:p>
             <a:fld id="{39B7EDB1-CE74-4951-85A2-0B01C2128E28}" type="datetime1">
               <a:rPr lang="en-US" smtClean="0"/>
-              <a:t>2/13/2022</a:t>
+              <a:t>2/14/2022</a:t>
             </a:fld>
             <a:endParaRPr lang="en-US"/>
           </a:p>
@@ -4078,7 +4078,7 @@
           <a:p>
             <a:fld id="{2BC7EB92-A5C2-4807-A9DC-9EDE6CBFB241}" type="datetime1">
               <a:rPr lang="en-US" smtClean="0"/>
-              <a:t>2/13/2022</a:t>
+              <a:t>2/14/2022</a:t>
             </a:fld>
             <a:endParaRPr lang="en-US"/>
           </a:p>
@@ -4225,7 +4225,7 @@
           <a:p>
             <a:fld id="{109E55A0-C911-4F03-82FC-7E5926047D46}" type="datetime1">
               <a:rPr lang="en-US" smtClean="0"/>
-              <a:t>2/13/2022</a:t>
+              <a:t>2/14/2022</a:t>
             </a:fld>
             <a:endParaRPr lang="en-US"/>
           </a:p>
@@ -4374,7 +4374,7 @@
           <a:p>
             <a:fld id="{2B7B7EE0-7771-4CD5-9B2B-3550753A54A1}" type="datetime1">
               <a:rPr lang="en-US" smtClean="0"/>
-              <a:t>2/13/2022</a:t>
+              <a:t>2/14/2022</a:t>
             </a:fld>
             <a:endParaRPr lang="en-US"/>
           </a:p>
@@ -4685,7 +4685,7 @@
           <a:p>
             <a:fld id="{F8B318B3-0E87-4416-A9B8-D891968C2727}" type="datetime1">
               <a:rPr lang="en-US" smtClean="0"/>
-              <a:t>2/13/2022</a:t>
+              <a:t>2/14/2022</a:t>
             </a:fld>
             <a:endParaRPr lang="en-US"/>
           </a:p>
@@ -4976,7 +4976,7 @@
           <a:p>
             <a:fld id="{EA476A42-A091-4468-A075-64A31BE59948}" type="datetime1">
               <a:rPr lang="en-US" smtClean="0"/>
-              <a:t>2/13/2022</a:t>
+              <a:t>2/14/2022</a:t>
             </a:fld>
             <a:endParaRPr lang="en-US"/>
           </a:p>
@@ -5219,7 +5219,7 @@
           <a:p>
             <a:fld id="{54D997E8-DDEE-43F1-8D9B-F8A1E11DE488}" type="datetime1">
               <a:rPr lang="en-US" smtClean="0"/>
-              <a:t>2/13/2022</a:t>
+              <a:t>2/14/2022</a:t>
             </a:fld>
             <a:endParaRPr lang="en-US"/>
           </a:p>
@@ -5671,7 +5671,7 @@
               <a:rPr lang="en-US" altLang="en-US" sz="3200" dirty="0">
                 <a:sym typeface="Helvetica Neue" charset="0"/>
               </a:rPr>
-              <a:t>CS 4350: Fundamentals of Software Engineering</a:t>
+              <a:t>CS 4530: Fundamentals of Software Engineering</a:t>
             </a:r>
             <a:br>
               <a:rPr lang="en-US" altLang="en-US" sz="3200" dirty="0">
@@ -5699,7 +5699,7 @@
               <a:rPr lang="en-US" altLang="en-US" sz="3200" dirty="0">
                 <a:sym typeface="Helvetica Neue" charset="0"/>
               </a:rPr>
-              <a:t> Introduction to Testing and TDD</a:t>
+              <a:t> Introduction to Testing</a:t>
             </a:r>
             <a:endParaRPr lang="en-US" sz="3200" dirty="0"/>
           </a:p>
@@ -6135,7 +6135,7 @@
           </a:ln>
           <a:extLst>
             <a:ext uri="{C572A759-6A51-4108-AA02-DFA0A04FC94B}">
-              <ma14:wrappingTextBoxFlag xmlns:ma14="http://schemas.microsoft.com/office/mac/drawingml/2011/main" xmlns:a14="http://schemas.microsoft.com/office/drawing/2010/main" xmlns:m="http://schemas.openxmlformats.org/officeDocument/2006/math" xmlns="" val="1"/>
+              <ma14:wrappingTextBoxFlag xmlns="" xmlns:m="http://schemas.openxmlformats.org/officeDocument/2006/math" xmlns:a14="http://schemas.microsoft.com/office/drawing/2010/main" xmlns:ma14="http://schemas.microsoft.com/office/mac/drawingml/2011/main" val="1"/>
             </a:ext>
           </a:extLst>
         </p:spPr>
@@ -6242,7 +6242,7 @@
             <a:effectLst/>
             <a:extLst>
               <a:ext uri="{C572A759-6A51-4108-AA02-DFA0A04FC94B}">
-                <ma14:wrappingTextBoxFlag xmlns:ma14="http://schemas.microsoft.com/office/mac/drawingml/2011/main" xmlns:a14="http://schemas.microsoft.com/office/drawing/2010/main" xmlns:m="http://schemas.openxmlformats.org/officeDocument/2006/math" xmlns="" val="1"/>
+                <ma14:wrappingTextBoxFlag xmlns="" xmlns:m="http://schemas.openxmlformats.org/officeDocument/2006/math" xmlns:a14="http://schemas.microsoft.com/office/drawing/2010/main" xmlns:ma14="http://schemas.microsoft.com/office/mac/drawingml/2011/main" val="1"/>
               </a:ext>
             </a:extLst>
           </p:spPr>
@@ -6401,7 +6401,7 @@
             </a:effectLst>
             <a:extLst>
               <a:ext uri="{C572A759-6A51-4108-AA02-DFA0A04FC94B}">
-                <ma14:wrappingTextBoxFlag xmlns:ma14="http://schemas.microsoft.com/office/mac/drawingml/2011/main" xmlns:a14="http://schemas.microsoft.com/office/drawing/2010/main" xmlns:m="http://schemas.openxmlformats.org/officeDocument/2006/math" xmlns="" val="1"/>
+                <ma14:wrappingTextBoxFlag xmlns="" xmlns:m="http://schemas.openxmlformats.org/officeDocument/2006/math" xmlns:a14="http://schemas.microsoft.com/office/drawing/2010/main" xmlns:ma14="http://schemas.microsoft.com/office/mac/drawingml/2011/main" val="1"/>
               </a:ext>
             </a:extLst>
           </p:spPr>
@@ -6546,7 +6546,7 @@
           </a:ln>
           <a:extLst>
             <a:ext uri="{C572A759-6A51-4108-AA02-DFA0A04FC94B}">
-              <ma14:wrappingTextBoxFlag xmlns:ma14="http://schemas.microsoft.com/office/mac/drawingml/2011/main" xmlns:a14="http://schemas.microsoft.com/office/drawing/2010/main" xmlns:m="http://schemas.openxmlformats.org/officeDocument/2006/math" xmlns="" val="1"/>
+              <ma14:wrappingTextBoxFlag xmlns="" xmlns:m="http://schemas.openxmlformats.org/officeDocument/2006/math" xmlns:a14="http://schemas.microsoft.com/office/drawing/2010/main" xmlns:ma14="http://schemas.microsoft.com/office/mac/drawingml/2011/main" val="1"/>
             </a:ext>
           </a:extLst>
         </p:spPr>
@@ -6596,7 +6596,7 @@
           </a:ln>
           <a:extLst>
             <a:ext uri="{C572A759-6A51-4108-AA02-DFA0A04FC94B}">
-              <ma14:wrappingTextBoxFlag xmlns:ma14="http://schemas.microsoft.com/office/mac/drawingml/2011/main" xmlns:a14="http://schemas.microsoft.com/office/drawing/2010/main" xmlns:m="http://schemas.openxmlformats.org/officeDocument/2006/math" xmlns="" val="1"/>
+              <ma14:wrappingTextBoxFlag xmlns="" xmlns:m="http://schemas.openxmlformats.org/officeDocument/2006/math" xmlns:a14="http://schemas.microsoft.com/office/drawing/2010/main" xmlns:ma14="http://schemas.microsoft.com/office/mac/drawingml/2011/main" val="1"/>
             </a:ext>
           </a:extLst>
         </p:spPr>
@@ -6703,7 +6703,7 @@
             <a:effectLst/>
             <a:extLst>
               <a:ext uri="{C572A759-6A51-4108-AA02-DFA0A04FC94B}">
-                <ma14:wrappingTextBoxFlag xmlns:ma14="http://schemas.microsoft.com/office/mac/drawingml/2011/main" xmlns:a14="http://schemas.microsoft.com/office/drawing/2010/main" xmlns:m="http://schemas.openxmlformats.org/officeDocument/2006/math" xmlns="" val="1"/>
+                <ma14:wrappingTextBoxFlag xmlns="" xmlns:m="http://schemas.openxmlformats.org/officeDocument/2006/math" xmlns:a14="http://schemas.microsoft.com/office/drawing/2010/main" xmlns:ma14="http://schemas.microsoft.com/office/mac/drawingml/2011/main" val="1"/>
               </a:ext>
             </a:extLst>
           </p:spPr>
@@ -6846,7 +6846,7 @@
             <a:effectLst/>
             <a:extLst>
               <a:ext uri="{C572A759-6A51-4108-AA02-DFA0A04FC94B}">
-                <ma14:wrappingTextBoxFlag xmlns:ma14="http://schemas.microsoft.com/office/mac/drawingml/2011/main" xmlns:a14="http://schemas.microsoft.com/office/drawing/2010/main" xmlns:m="http://schemas.openxmlformats.org/officeDocument/2006/math" xmlns="" val="1"/>
+                <ma14:wrappingTextBoxFlag xmlns="" xmlns:m="http://schemas.openxmlformats.org/officeDocument/2006/math" xmlns:a14="http://schemas.microsoft.com/office/drawing/2010/main" xmlns:ma14="http://schemas.microsoft.com/office/mac/drawingml/2011/main" val="1"/>
               </a:ext>
             </a:extLst>
           </p:spPr>
@@ -8055,7 +8055,7 @@
           </a:effectLst>
           <a:extLst>
             <a:ext uri="{C572A759-6A51-4108-AA02-DFA0A04FC94B}">
-              <ma14:wrappingTextBoxFlag xmlns="" xmlns:m="http://schemas.openxmlformats.org/officeDocument/2006/math" xmlns:a14="http://schemas.microsoft.com/office/drawing/2010/main" xmlns:ma14="http://schemas.microsoft.com/office/mac/drawingml/2011/main" val="1"/>
+              <ma14:wrappingTextBoxFlag xmlns:ma14="http://schemas.microsoft.com/office/mac/drawingml/2011/main" xmlns:a14="http://schemas.microsoft.com/office/drawing/2010/main" xmlns:m="http://schemas.openxmlformats.org/officeDocument/2006/math" xmlns="" val="1"/>
             </a:ext>
           </a:extLst>
         </p:spPr>

</xml_diff>